<commit_message>
- fix lads images and c#, hidden slides in pp about send mails
</commit_message>
<xml_diff>
--- a/01 - Microsoft Adaptive Cards/02 Cards and Actions/02 Sending Actionable Messages.pptx
+++ b/01 - Microsoft Adaptive Cards/02 Cards and Actions/02 Sending Actionable Messages.pptx
@@ -167,7 +167,7 @@
 
 <file path=ppt/commentAuthors.xml><?xml version="1.0" encoding="utf-8"?>
 <p:cmAuthorLst xmlns:a="http://schemas.openxmlformats.org/drawingml/2006/main" xmlns:r="http://schemas.openxmlformats.org/officeDocument/2006/relationships" xmlns:p="http://schemas.openxmlformats.org/presentationml/2006/main">
-  <p:cmAuthor id="4" name="Author" initials="A" lastIdx="0" clrIdx="4"/>
+  <p:cmAuthor id="5" name="Forfatter" initials="F" lastIdx="0" clrIdx="5"/>
 </p:cmAuthorLst>
 </file>
 
@@ -257,7 +257,7 @@
               <a:rPr lang="en-US" smtClean="0">
                 <a:latin typeface="Segoe UI" pitchFamily="34" charset="0"/>
               </a:rPr>
-              <a:t>10/25/2017 8:53 AM</a:t>
+              <a:t>10/15/2018 10:12 AM</a:t>
             </a:fld>
             <a:endParaRPr lang="en-US" dirty="0">
               <a:latin typeface="Segoe UI" pitchFamily="34" charset="0"/>
@@ -346,7 +346,7 @@
               <a:rPr lang="en-US" smtClean="0">
                 <a:latin typeface="Segoe UI" pitchFamily="34" charset="0"/>
               </a:rPr>
-              <a:t>‹#›</a:t>
+              <a:t>‹nr.›</a:t>
             </a:fld>
             <a:endParaRPr lang="en-US" dirty="0">
               <a:latin typeface="Segoe UI" pitchFamily="34" charset="0"/>
@@ -551,7 +551,7 @@
           <a:p>
             <a:fld id="{D18B56EA-E28F-4F92-9F16-7A6F2501B303}" type="datetime8">
               <a:rPr lang="en-US" smtClean="0"/>
-              <a:t>10/25/2017 8:53 AM</a:t>
+              <a:t>10/15/2018 10:12 AM</a:t>
             </a:fld>
             <a:endParaRPr lang="en-US" dirty="0"/>
           </a:p>
@@ -648,7 +648,7 @@
             <a:fld id="{B4008EB6-D09E-4580-8CD6-DDB14511944F}" type="slidenum">
               <a:rPr lang="en-US" smtClean="0"/>
               <a:pPr/>
-              <a:t>‹#›</a:t>
+              <a:t>‹nr.›</a:t>
             </a:fld>
             <a:endParaRPr lang="en-US" dirty="0"/>
           </a:p>
@@ -1039,7 +1039,7 @@
                 <a:tabLst/>
                 <a:defRPr/>
               </a:pPr>
-              <a:t>10/25/2017 8:53 AM</a:t>
+              <a:t>10/15/2018 10:12 AM</a:t>
             </a:fld>
             <a:endParaRPr kumimoji="0" lang="en-US" sz="1200" b="0" i="0" u="none" strike="noStrike" kern="1200" cap="none" spc="0" normalizeH="0" baseline="0" noProof="0" dirty="0">
               <a:ln>
@@ -1292,7 +1292,7 @@
           <a:p>
             <a:fld id="{D18B56EA-E28F-4F92-9F16-7A6F2501B303}" type="datetime8">
               <a:rPr lang="en-US" smtClean="0"/>
-              <a:t>10/25/2017 8:53 AM</a:t>
+              <a:t>10/15/2018 10:12 AM</a:t>
             </a:fld>
             <a:endParaRPr lang="en-US" dirty="0"/>
           </a:p>
@@ -1578,7 +1578,7 @@
                 <a:tabLst/>
                 <a:defRPr/>
               </a:pPr>
-              <a:t>10/25/2017 8:53 AM</a:t>
+              <a:t>10/15/2018 10:12 AM</a:t>
             </a:fld>
             <a:endParaRPr kumimoji="0" lang="en-US" sz="1200" b="0" i="0" u="none" strike="noStrike" kern="1200" cap="none" spc="0" normalizeH="0" baseline="0" noProof="0" dirty="0">
               <a:ln>
@@ -1842,7 +1842,7 @@
           <a:p>
             <a:fld id="{D18B56EA-E28F-4F92-9F16-7A6F2501B303}" type="datetime8">
               <a:rPr lang="en-US" smtClean="0"/>
-              <a:t>10/25/2017 8:53 AM</a:t>
+              <a:t>10/15/2018 10:12 AM</a:t>
             </a:fld>
             <a:endParaRPr lang="en-US" dirty="0"/>
           </a:p>
@@ -2050,7 +2050,7 @@
           <a:p>
             <a:fld id="{D18B56EA-E28F-4F92-9F16-7A6F2501B303}" type="datetime8">
               <a:rPr lang="en-US" smtClean="0"/>
-              <a:t>10/25/2017 8:53 AM</a:t>
+              <a:t>10/15/2018 10:12 AM</a:t>
             </a:fld>
             <a:endParaRPr lang="en-US" dirty="0"/>
           </a:p>
@@ -2311,7 +2311,7 @@
           <a:p>
             <a:fld id="{D18B56EA-E28F-4F92-9F16-7A6F2501B303}" type="datetime8">
               <a:rPr lang="en-US" smtClean="0"/>
-              <a:t>10/25/2017 8:53 AM</a:t>
+              <a:t>10/15/2018 10:12 AM</a:t>
             </a:fld>
             <a:endParaRPr lang="en-US" dirty="0"/>
           </a:p>
@@ -2572,7 +2572,7 @@
           <a:p>
             <a:fld id="{D18B56EA-E28F-4F92-9F16-7A6F2501B303}" type="datetime8">
               <a:rPr lang="en-US" smtClean="0"/>
-              <a:t>10/25/2017 8:53 AM</a:t>
+              <a:t>10/15/2018 10:12 AM</a:t>
             </a:fld>
             <a:endParaRPr lang="en-US" dirty="0"/>
           </a:p>
@@ -2833,7 +2833,7 @@
           <a:p>
             <a:fld id="{D18B56EA-E28F-4F92-9F16-7A6F2501B303}" type="datetime8">
               <a:rPr lang="en-US" smtClean="0"/>
-              <a:t>10/25/2017 8:53 AM</a:t>
+              <a:t>10/15/2018 10:12 AM</a:t>
             </a:fld>
             <a:endParaRPr lang="en-US" dirty="0"/>
           </a:p>
@@ -3014,7 +3014,7 @@
           <a:p>
             <a:fld id="{D18B56EA-E28F-4F92-9F16-7A6F2501B303}" type="datetime8">
               <a:rPr lang="en-US" smtClean="0"/>
-              <a:t>10/25/2017 8:53 AM</a:t>
+              <a:t>10/15/2018 10:12 AM</a:t>
             </a:fld>
             <a:endParaRPr lang="en-US" dirty="0"/>
           </a:p>
@@ -3195,7 +3195,7 @@
           <a:p>
             <a:fld id="{D18B56EA-E28F-4F92-9F16-7A6F2501B303}" type="datetime8">
               <a:rPr lang="en-US" smtClean="0"/>
-              <a:t>10/25/2017 8:53 AM</a:t>
+              <a:t>10/15/2018 10:12 AM</a:t>
             </a:fld>
             <a:endParaRPr lang="en-US" dirty="0"/>
           </a:p>
@@ -17982,7 +17982,7 @@
 </file>
 
 <file path=ppt/slides/slide6.xml><?xml version="1.0" encoding="utf-8"?>
-<p:sld xmlns:a="http://schemas.openxmlformats.org/drawingml/2006/main" xmlns:r="http://schemas.openxmlformats.org/officeDocument/2006/relationships" xmlns:p="http://schemas.openxmlformats.org/presentationml/2006/main">
+<p:sld xmlns:a="http://schemas.openxmlformats.org/drawingml/2006/main" xmlns:r="http://schemas.openxmlformats.org/officeDocument/2006/relationships" xmlns:p="http://schemas.openxmlformats.org/presentationml/2006/main" show="0">
   <p:cSld>
     <p:spTree>
       <p:nvGrpSpPr>
@@ -20776,7 +20776,7 @@
 </file>
 
 <file path=ppt/slides/slide7.xml><?xml version="1.0" encoding="utf-8"?>
-<p:sld xmlns:a="http://schemas.openxmlformats.org/drawingml/2006/main" xmlns:r="http://schemas.openxmlformats.org/officeDocument/2006/relationships" xmlns:p="http://schemas.openxmlformats.org/presentationml/2006/main">
+<p:sld xmlns:a="http://schemas.openxmlformats.org/drawingml/2006/main" xmlns:r="http://schemas.openxmlformats.org/officeDocument/2006/relationships" xmlns:p="http://schemas.openxmlformats.org/presentationml/2006/main" show="0">
   <p:cSld>
     <p:spTree>
       <p:nvGrpSpPr>

</xml_diff>